<commit_message>
Validation terminer + fin de la traduction partie milieu de stage
</commit_message>
<xml_diff>
--- a/Documentation/SchémaModificationMilieudeStage.pptx
+++ b/Documentation/SchémaModificationMilieudeStage.pptx
@@ -207,7 +207,7 @@
           <a:p>
             <a:fld id="{DDBC4D3D-7E0D-4ED3-B610-3E5FDACC8A4D}" type="datetimeFigureOut">
               <a:rPr lang="fr-CA" smtClean="0"/>
-              <a:t>2020-04-07</a:t>
+              <a:t>2020-04-09</a:t>
             </a:fld>
             <a:endParaRPr lang="fr-CA"/>
           </a:p>
@@ -606,7 +606,7 @@
           <a:p>
             <a:fld id="{952D37C9-57C9-4E74-9BE9-5A5CF4DA06F6}" type="datetimeFigureOut">
               <a:rPr lang="fr-CA" smtClean="0"/>
-              <a:t>2020-04-07</a:t>
+              <a:t>2020-04-09</a:t>
             </a:fld>
             <a:endParaRPr lang="fr-CA"/>
           </a:p>
@@ -776,7 +776,7 @@
           <a:p>
             <a:fld id="{952D37C9-57C9-4E74-9BE9-5A5CF4DA06F6}" type="datetimeFigureOut">
               <a:rPr lang="fr-CA" smtClean="0"/>
-              <a:t>2020-04-07</a:t>
+              <a:t>2020-04-09</a:t>
             </a:fld>
             <a:endParaRPr lang="fr-CA"/>
           </a:p>
@@ -956,7 +956,7 @@
           <a:p>
             <a:fld id="{952D37C9-57C9-4E74-9BE9-5A5CF4DA06F6}" type="datetimeFigureOut">
               <a:rPr lang="fr-CA" smtClean="0"/>
-              <a:t>2020-04-07</a:t>
+              <a:t>2020-04-09</a:t>
             </a:fld>
             <a:endParaRPr lang="fr-CA"/>
           </a:p>
@@ -1126,7 +1126,7 @@
           <a:p>
             <a:fld id="{952D37C9-57C9-4E74-9BE9-5A5CF4DA06F6}" type="datetimeFigureOut">
               <a:rPr lang="fr-CA" smtClean="0"/>
-              <a:t>2020-04-07</a:t>
+              <a:t>2020-04-09</a:t>
             </a:fld>
             <a:endParaRPr lang="fr-CA"/>
           </a:p>
@@ -1372,7 +1372,7 @@
           <a:p>
             <a:fld id="{952D37C9-57C9-4E74-9BE9-5A5CF4DA06F6}" type="datetimeFigureOut">
               <a:rPr lang="fr-CA" smtClean="0"/>
-              <a:t>2020-04-07</a:t>
+              <a:t>2020-04-09</a:t>
             </a:fld>
             <a:endParaRPr lang="fr-CA"/>
           </a:p>
@@ -1604,7 +1604,7 @@
           <a:p>
             <a:fld id="{952D37C9-57C9-4E74-9BE9-5A5CF4DA06F6}" type="datetimeFigureOut">
               <a:rPr lang="fr-CA" smtClean="0"/>
-              <a:t>2020-04-07</a:t>
+              <a:t>2020-04-09</a:t>
             </a:fld>
             <a:endParaRPr lang="fr-CA"/>
           </a:p>
@@ -1971,7 +1971,7 @@
           <a:p>
             <a:fld id="{952D37C9-57C9-4E74-9BE9-5A5CF4DA06F6}" type="datetimeFigureOut">
               <a:rPr lang="fr-CA" smtClean="0"/>
-              <a:t>2020-04-07</a:t>
+              <a:t>2020-04-09</a:t>
             </a:fld>
             <a:endParaRPr lang="fr-CA"/>
           </a:p>
@@ -2089,7 +2089,7 @@
           <a:p>
             <a:fld id="{952D37C9-57C9-4E74-9BE9-5A5CF4DA06F6}" type="datetimeFigureOut">
               <a:rPr lang="fr-CA" smtClean="0"/>
-              <a:t>2020-04-07</a:t>
+              <a:t>2020-04-09</a:t>
             </a:fld>
             <a:endParaRPr lang="fr-CA"/>
           </a:p>
@@ -2184,7 +2184,7 @@
           <a:p>
             <a:fld id="{952D37C9-57C9-4E74-9BE9-5A5CF4DA06F6}" type="datetimeFigureOut">
               <a:rPr lang="fr-CA" smtClean="0"/>
-              <a:t>2020-04-07</a:t>
+              <a:t>2020-04-09</a:t>
             </a:fld>
             <a:endParaRPr lang="fr-CA"/>
           </a:p>
@@ -2461,7 +2461,7 @@
           <a:p>
             <a:fld id="{952D37C9-57C9-4E74-9BE9-5A5CF4DA06F6}" type="datetimeFigureOut">
               <a:rPr lang="fr-CA" smtClean="0"/>
-              <a:t>2020-04-07</a:t>
+              <a:t>2020-04-09</a:t>
             </a:fld>
             <a:endParaRPr lang="fr-CA"/>
           </a:p>
@@ -2714,7 +2714,7 @@
           <a:p>
             <a:fld id="{952D37C9-57C9-4E74-9BE9-5A5CF4DA06F6}" type="datetimeFigureOut">
               <a:rPr lang="fr-CA" smtClean="0"/>
-              <a:t>2020-04-07</a:t>
+              <a:t>2020-04-09</a:t>
             </a:fld>
             <a:endParaRPr lang="fr-CA"/>
           </a:p>
@@ -2927,7 +2927,7 @@
           <a:p>
             <a:fld id="{952D37C9-57C9-4E74-9BE9-5A5CF4DA06F6}" type="datetimeFigureOut">
               <a:rPr lang="fr-CA" smtClean="0"/>
-              <a:t>2020-04-07</a:t>
+              <a:t>2020-04-09</a:t>
             </a:fld>
             <a:endParaRPr lang="fr-CA"/>
           </a:p>

</xml_diff>